<commit_message>
Updated powerpoint and added using LINQ to ensure proper operation.
</commit_message>
<xml_diff>
--- a/IntroToProgramming/Introduction to C#.pptx
+++ b/IntroToProgramming/Introduction to C#.pptx
@@ -30,8 +30,8 @@
     <p:sldId id="354" r:id="rId24"/>
     <p:sldId id="355" r:id="rId25"/>
     <p:sldId id="265" r:id="rId26"/>
-    <p:sldId id="266" r:id="rId27"/>
-    <p:sldId id="267" r:id="rId28"/>
+    <p:sldId id="267" r:id="rId27"/>
+    <p:sldId id="266" r:id="rId28"/>
     <p:sldId id="268" r:id="rId29"/>
     <p:sldId id="269" r:id="rId30"/>
     <p:sldId id="270" r:id="rId31"/>
@@ -57,9 +57,9 @@
     <p:sldId id="291" r:id="rId51"/>
     <p:sldId id="292" r:id="rId52"/>
     <p:sldId id="293" r:id="rId53"/>
-    <p:sldId id="294" r:id="rId54"/>
-    <p:sldId id="295" r:id="rId55"/>
-    <p:sldId id="296" r:id="rId56"/>
+    <p:sldId id="296" r:id="rId54"/>
+    <p:sldId id="294" r:id="rId55"/>
+    <p:sldId id="295" r:id="rId56"/>
     <p:sldId id="297" r:id="rId57"/>
     <p:sldId id="298" r:id="rId58"/>
     <p:sldId id="299" r:id="rId59"/>
@@ -407,7 +407,7 @@
           <a:p>
             <a:fld id="{188CE4B7-E498-4E28-ACF9-791E71DFFE50}" type="datetimeFigureOut">
               <a:rPr lang="en-US" smtClean="0"/>
-              <a:t>8/31/2019</a:t>
+              <a:t>9/3/2019</a:t>
             </a:fld>
             <a:endParaRPr lang="en-US"/>
           </a:p>
@@ -601,7 +601,7 @@
           <a:p>
             <a:fld id="{188CE4B7-E498-4E28-ACF9-791E71DFFE50}" type="datetimeFigureOut">
               <a:rPr lang="en-US" smtClean="0"/>
-              <a:t>8/31/2019</a:t>
+              <a:t>9/3/2019</a:t>
             </a:fld>
             <a:endParaRPr lang="en-US"/>
           </a:p>
@@ -789,7 +789,7 @@
           <a:p>
             <a:fld id="{188CE4B7-E498-4E28-ACF9-791E71DFFE50}" type="datetimeFigureOut">
               <a:rPr lang="en-US" smtClean="0"/>
-              <a:t>8/31/2019</a:t>
+              <a:t>9/3/2019</a:t>
             </a:fld>
             <a:endParaRPr lang="en-US"/>
           </a:p>
@@ -1018,7 +1018,7 @@
           <a:p>
             <a:fld id="{188CE4B7-E498-4E28-ACF9-791E71DFFE50}" type="datetimeFigureOut">
               <a:rPr lang="en-US" smtClean="0"/>
-              <a:t>8/31/2019</a:t>
+              <a:t>9/3/2019</a:t>
             </a:fld>
             <a:endParaRPr lang="en-US"/>
           </a:p>
@@ -1294,7 +1294,7 @@
           <a:p>
             <a:fld id="{188CE4B7-E498-4E28-ACF9-791E71DFFE50}" type="datetimeFigureOut">
               <a:rPr lang="en-US" smtClean="0"/>
-              <a:t>8/31/2019</a:t>
+              <a:t>9/3/2019</a:t>
             </a:fld>
             <a:endParaRPr lang="en-US"/>
           </a:p>
@@ -1582,7 +1582,7 @@
           <a:p>
             <a:fld id="{188CE4B7-E498-4E28-ACF9-791E71DFFE50}" type="datetimeFigureOut">
               <a:rPr lang="en-US" smtClean="0"/>
-              <a:t>8/31/2019</a:t>
+              <a:t>9/3/2019</a:t>
             </a:fld>
             <a:endParaRPr lang="en-US"/>
           </a:p>
@@ -2136,7 +2136,7 @@
           <a:p>
             <a:fld id="{188CE4B7-E498-4E28-ACF9-791E71DFFE50}" type="datetimeFigureOut">
               <a:rPr lang="en-US" smtClean="0"/>
-              <a:t>8/31/2019</a:t>
+              <a:t>9/3/2019</a:t>
             </a:fld>
             <a:endParaRPr lang="en-US"/>
           </a:p>
@@ -2267,7 +2267,7 @@
           <a:p>
             <a:fld id="{188CE4B7-E498-4E28-ACF9-791E71DFFE50}" type="datetimeFigureOut">
               <a:rPr lang="en-US" smtClean="0"/>
-              <a:t>8/31/2019</a:t>
+              <a:t>9/3/2019</a:t>
             </a:fld>
             <a:endParaRPr lang="en-US"/>
           </a:p>
@@ -2417,7 +2417,7 @@
           <a:p>
             <a:fld id="{188CE4B7-E498-4E28-ACF9-791E71DFFE50}" type="datetimeFigureOut">
               <a:rPr lang="en-US" smtClean="0"/>
-              <a:t>8/31/2019</a:t>
+              <a:t>9/3/2019</a:t>
             </a:fld>
             <a:endParaRPr lang="en-US"/>
           </a:p>
@@ -2733,7 +2733,7 @@
           <a:p>
             <a:fld id="{188CE4B7-E498-4E28-ACF9-791E71DFFE50}" type="datetimeFigureOut">
               <a:rPr lang="en-US" smtClean="0"/>
-              <a:t>8/31/2019</a:t>
+              <a:t>9/3/2019</a:t>
             </a:fld>
             <a:endParaRPr lang="en-US"/>
           </a:p>
@@ -3030,7 +3030,7 @@
           <a:p>
             <a:fld id="{188CE4B7-E498-4E28-ACF9-791E71DFFE50}" type="datetimeFigureOut">
               <a:rPr lang="en-US" smtClean="0"/>
-              <a:t>8/31/2019</a:t>
+              <a:t>9/3/2019</a:t>
             </a:fld>
             <a:endParaRPr lang="en-US"/>
           </a:p>
@@ -3275,7 +3275,7 @@
           <a:p>
             <a:fld id="{188CE4B7-E498-4E28-ACF9-791E71DFFE50}" type="datetimeFigureOut">
               <a:rPr lang="en-US" smtClean="0"/>
-              <a:t>8/31/2019</a:t>
+              <a:t>9/3/2019</a:t>
             </a:fld>
             <a:endParaRPr lang="en-US"/>
           </a:p>
@@ -3803,11 +3803,7 @@
           <a:p>
             <a:r>
               <a:rPr lang="en-US" dirty="0" smtClean="0"/>
-              <a:t>Building your first </a:t>
-            </a:r>
-            <a:r>
-              <a:rPr lang="en-US" dirty="0" smtClean="0"/>
-              <a:t>application</a:t>
+              <a:t>Building your first application</a:t>
             </a:r>
             <a:endParaRPr lang="en-US" dirty="0"/>
           </a:p>
@@ -4024,6 +4020,13 @@
   <p:clrMapOvr>
     <a:masterClrMapping/>
   </p:clrMapOvr>
+  <p:timing>
+    <p:tnLst>
+      <p:par>
+        <p:cTn id="1" dur="indefinite" restart="never" nodeType="tmRoot"/>
+      </p:par>
+    </p:tnLst>
+  </p:timing>
 </p:sld>
 </file>
 
@@ -4244,6 +4247,13 @@
   <p:clrMapOvr>
     <a:masterClrMapping/>
   </p:clrMapOvr>
+  <p:timing>
+    <p:tnLst>
+      <p:par>
+        <p:cTn id="1" dur="indefinite" restart="never" nodeType="tmRoot"/>
+      </p:par>
+    </p:tnLst>
+  </p:timing>
 </p:sld>
 </file>
 
@@ -4461,6 +4471,13 @@
   <p:clrMapOvr>
     <a:masterClrMapping/>
   </p:clrMapOvr>
+  <p:timing>
+    <p:tnLst>
+      <p:par>
+        <p:cTn id="1" dur="indefinite" restart="never" nodeType="tmRoot"/>
+      </p:par>
+    </p:tnLst>
+  </p:timing>
 </p:sld>
 </file>
 
@@ -4693,6 +4710,13 @@
   <p:clrMapOvr>
     <a:masterClrMapping/>
   </p:clrMapOvr>
+  <p:timing>
+    <p:tnLst>
+      <p:par>
+        <p:cTn id="1" dur="indefinite" restart="never" nodeType="tmRoot"/>
+      </p:par>
+    </p:tnLst>
+  </p:timing>
 </p:sld>
 </file>
 
@@ -4905,6 +4929,13 @@
   <p:clrMapOvr>
     <a:masterClrMapping/>
   </p:clrMapOvr>
+  <p:timing>
+    <p:tnLst>
+      <p:par>
+        <p:cTn id="1" dur="indefinite" restart="never" nodeType="tmRoot"/>
+      </p:par>
+    </p:tnLst>
+  </p:timing>
 </p:sld>
 </file>
 
@@ -5114,6 +5145,13 @@
   <p:clrMapOvr>
     <a:masterClrMapping/>
   </p:clrMapOvr>
+  <p:timing>
+    <p:tnLst>
+      <p:par>
+        <p:cTn id="1" dur="indefinite" restart="never" nodeType="tmRoot"/>
+      </p:par>
+    </p:tnLst>
+  </p:timing>
 </p:sld>
 </file>
 
@@ -5336,6 +5374,13 @@
   <p:clrMapOvr>
     <a:masterClrMapping/>
   </p:clrMapOvr>
+  <p:timing>
+    <p:tnLst>
+      <p:par>
+        <p:cTn id="1" dur="indefinite" restart="never" nodeType="tmRoot"/>
+      </p:par>
+    </p:tnLst>
+  </p:timing>
 </p:sld>
 </file>
 
@@ -5536,6 +5581,13 @@
   <p:clrMapOvr>
     <a:masterClrMapping/>
   </p:clrMapOvr>
+  <p:timing>
+    <p:tnLst>
+      <p:par>
+        <p:cTn id="1" dur="indefinite" restart="never" nodeType="tmRoot"/>
+      </p:par>
+    </p:tnLst>
+  </p:timing>
 </p:sld>
 </file>
 
@@ -5732,6 +5784,13 @@
   <p:clrMapOvr>
     <a:masterClrMapping/>
   </p:clrMapOvr>
+  <p:timing>
+    <p:tnLst>
+      <p:par>
+        <p:cTn id="1" dur="indefinite" restart="never" nodeType="tmRoot"/>
+      </p:par>
+    </p:tnLst>
+  </p:timing>
 </p:sld>
 </file>
 
@@ -5922,6 +5981,13 @@
   <p:clrMapOvr>
     <a:masterClrMapping/>
   </p:clrMapOvr>
+  <p:timing>
+    <p:tnLst>
+      <p:par>
+        <p:cTn id="1" dur="indefinite" restart="never" nodeType="tmRoot"/>
+      </p:par>
+    </p:tnLst>
+  </p:timing>
 </p:sld>
 </file>
 
@@ -5988,15 +6054,7 @@
             </a:pPr>
             <a:r>
               <a:rPr lang="en-US" sz="2400" dirty="0" smtClean="0"/>
-              <a:t>Installing </a:t>
-            </a:r>
-            <a:r>
-              <a:rPr lang="en-US" sz="2400" dirty="0" smtClean="0"/>
-              <a:t>Visual Studios 2019 </a:t>
-            </a:r>
-            <a:r>
-              <a:rPr lang="en-US" sz="2400" dirty="0" smtClean="0"/>
-              <a:t>Community</a:t>
+              <a:t>Installing Visual Studios 2019 Community</a:t>
             </a:r>
           </a:p>
           <a:p>
@@ -6012,7 +6070,6 @@
               <a:rPr lang="en-US" sz="2400" dirty="0" smtClean="0"/>
               <a:t>#</a:t>
             </a:r>
-            <a:endParaRPr lang="en-US" sz="2400" dirty="0" smtClean="0"/>
           </a:p>
           <a:p>
             <a:pPr>
@@ -6021,11 +6078,7 @@
             </a:pPr>
             <a:r>
               <a:rPr lang="en-US" sz="2400" dirty="0" smtClean="0"/>
-              <a:t>Understanding Visual Studios 2019 Development </a:t>
-            </a:r>
-            <a:r>
-              <a:rPr lang="en-US" sz="2400" dirty="0" smtClean="0"/>
-              <a:t>Environment</a:t>
+              <a:t>Understanding Visual Studios 2019 Development Environment</a:t>
             </a:r>
           </a:p>
           <a:p>
@@ -6037,7 +6090,6 @@
               <a:rPr lang="en-US" sz="2400" dirty="0" smtClean="0"/>
               <a:t>Cloning a Repository</a:t>
             </a:r>
-            <a:endParaRPr lang="en-US" sz="2400" dirty="0" smtClean="0"/>
           </a:p>
           <a:p>
             <a:pPr>
@@ -6337,6 +6389,13 @@
   <p:clrMapOvr>
     <a:masterClrMapping/>
   </p:clrMapOvr>
+  <p:timing>
+    <p:tnLst>
+      <p:par>
+        <p:cTn id="1" dur="indefinite" restart="never" nodeType="tmRoot"/>
+      </p:par>
+    </p:tnLst>
+  </p:timing>
 </p:sld>
 </file>
 
@@ -6507,6 +6566,13 @@
   <p:clrMapOvr>
     <a:masterClrMapping/>
   </p:clrMapOvr>
+  <p:timing>
+    <p:tnLst>
+      <p:par>
+        <p:cTn id="1" dur="indefinite" restart="never" nodeType="tmRoot"/>
+      </p:par>
+    </p:tnLst>
+  </p:timing>
 </p:sld>
 </file>
 
@@ -7180,8 +7246,8 @@
         </p:nvSpPr>
         <p:spPr>
           <a:xfrm>
-            <a:off x="990600" y="5105400"/>
-            <a:ext cx="7315200" cy="1164264"/>
+            <a:off x="990600" y="6172200"/>
+            <a:ext cx="7162800" cy="533400"/>
           </a:xfrm>
         </p:spPr>
         <p:txBody>
@@ -7190,22 +7256,22 @@
           </a:bodyPr>
           <a:lstStyle/>
           <a:p>
-            <a:pPr marL="285750" indent="-285750" algn="l">
-              <a:buFont typeface="Wingdings" pitchFamily="2" charset="2"/>
-              <a:buChar char="Ø"/>
-            </a:pPr>
-            <a:endParaRPr lang="en-US" sz="2000" b="1" dirty="0">
-              <a:solidFill>
-                <a:srgbClr val="FFFF00"/>
-              </a:solidFill>
-              <a:effectLst>
-                <a:outerShdw blurRad="38100" dist="38100" dir="2700000" algn="tl">
-                  <a:srgbClr val="000000">
-                    <a:alpha val="43137"/>
-                  </a:srgbClr>
-                </a:outerShdw>
-              </a:effectLst>
-            </a:endParaRPr>
+            <a:pPr algn="ctr"/>
+            <a:r>
+              <a:rPr lang="en-US" sz="2000" b="1" dirty="0">
+                <a:solidFill>
+                  <a:srgbClr val="FFFF00"/>
+                </a:solidFill>
+                <a:effectLst>
+                  <a:outerShdw blurRad="38100" dist="38100" dir="2700000" algn="tl">
+                    <a:srgbClr val="000000">
+                      <a:alpha val="43137"/>
+                    </a:srgbClr>
+                  </a:outerShdw>
+                </a:effectLst>
+              </a:rPr>
+              <a:t>https://github.com/plwest-atmark/Aug31.git</a:t>
+            </a:r>
           </a:p>
         </p:txBody>
       </p:sp>
@@ -7233,8 +7299,8 @@
         </p:blipFill>
         <p:spPr>
           <a:xfrm>
-            <a:off x="1002563" y="1206011"/>
-            <a:ext cx="7138875" cy="4842217"/>
+            <a:off x="1024317" y="1066800"/>
+            <a:ext cx="7095366" cy="4878414"/>
           </a:xfrm>
           <a:prstGeom prst="rect">
             <a:avLst/>
@@ -7251,10 +7317,50 @@
           </a:effectLst>
         </p:spPr>
       </p:pic>
+      <p:sp>
+        <p:nvSpPr>
+          <p:cNvPr id="4" name="Right Arrow 3"/>
+          <p:cNvSpPr/>
+          <p:nvPr/>
+        </p:nvSpPr>
+        <p:spPr>
+          <a:xfrm>
+            <a:off x="304800" y="2182368"/>
+            <a:ext cx="978408" cy="484632"/>
+          </a:xfrm>
+          <a:prstGeom prst="rightArrow">
+            <a:avLst/>
+          </a:prstGeom>
+        </p:spPr>
+        <p:style>
+          <a:lnRef idx="2">
+            <a:schemeClr val="accent1">
+              <a:shade val="50000"/>
+            </a:schemeClr>
+          </a:lnRef>
+          <a:fillRef idx="1">
+            <a:schemeClr val="accent1"/>
+          </a:fillRef>
+          <a:effectRef idx="0">
+            <a:schemeClr val="accent1"/>
+          </a:effectRef>
+          <a:fontRef idx="minor">
+            <a:schemeClr val="lt1"/>
+          </a:fontRef>
+        </p:style>
+        <p:txBody>
+          <a:bodyPr rtlCol="0" anchor="ctr"/>
+          <a:lstStyle/>
+          <a:p>
+            <a:pPr algn="ctr"/>
+            <a:endParaRPr lang="en-US"/>
+          </a:p>
+        </p:txBody>
+      </p:sp>
     </p:spTree>
     <p:extLst>
       <p:ext uri="{BB962C8B-B14F-4D97-AF65-F5344CB8AC3E}">
-        <p14:creationId xmlns:p14="http://schemas.microsoft.com/office/powerpoint/2010/main" val="1300930618"/>
+        <p14:creationId xmlns:p14="http://schemas.microsoft.com/office/powerpoint/2010/main" val="202993714"/>
       </p:ext>
     </p:extLst>
   </p:cSld>
@@ -7324,8 +7430,8 @@
         </p:nvSpPr>
         <p:spPr>
           <a:xfrm>
-            <a:off x="990600" y="6172200"/>
-            <a:ext cx="7162800" cy="533400"/>
+            <a:off x="990600" y="5105400"/>
+            <a:ext cx="7315200" cy="1164264"/>
           </a:xfrm>
         </p:spPr>
         <p:txBody>
@@ -7334,22 +7440,22 @@
           </a:bodyPr>
           <a:lstStyle/>
           <a:p>
-            <a:pPr algn="ctr"/>
-            <a:r>
-              <a:rPr lang="en-US" sz="2000" b="1" dirty="0">
-                <a:solidFill>
-                  <a:srgbClr val="FFFF00"/>
-                </a:solidFill>
-                <a:effectLst>
-                  <a:outerShdw blurRad="38100" dist="38100" dir="2700000" algn="tl">
-                    <a:srgbClr val="000000">
-                      <a:alpha val="43137"/>
-                    </a:srgbClr>
-                  </a:outerShdw>
-                </a:effectLst>
-              </a:rPr>
-              <a:t>https://github.com/plwest-atmark/Aug31.git</a:t>
-            </a:r>
+            <a:pPr marL="285750" indent="-285750" algn="l">
+              <a:buFont typeface="Wingdings" pitchFamily="2" charset="2"/>
+              <a:buChar char="Ø"/>
+            </a:pPr>
+            <a:endParaRPr lang="en-US" sz="2000" b="1" dirty="0">
+              <a:solidFill>
+                <a:srgbClr val="FFFF00"/>
+              </a:solidFill>
+              <a:effectLst>
+                <a:outerShdw blurRad="38100" dist="38100" dir="2700000" algn="tl">
+                  <a:srgbClr val="000000">
+                    <a:alpha val="43137"/>
+                  </a:srgbClr>
+                </a:outerShdw>
+              </a:effectLst>
+            </a:endParaRPr>
           </a:p>
         </p:txBody>
       </p:sp>
@@ -7377,8 +7483,8 @@
         </p:blipFill>
         <p:spPr>
           <a:xfrm>
-            <a:off x="1024317" y="1066800"/>
-            <a:ext cx="7095366" cy="4878414"/>
+            <a:off x="1002563" y="1206011"/>
+            <a:ext cx="7138875" cy="4842217"/>
           </a:xfrm>
           <a:prstGeom prst="rect">
             <a:avLst/>
@@ -7395,50 +7501,10 @@
           </a:effectLst>
         </p:spPr>
       </p:pic>
-      <p:sp>
-        <p:nvSpPr>
-          <p:cNvPr id="4" name="Right Arrow 3"/>
-          <p:cNvSpPr/>
-          <p:nvPr/>
-        </p:nvSpPr>
-        <p:spPr>
-          <a:xfrm>
-            <a:off x="304800" y="2182368"/>
-            <a:ext cx="978408" cy="484632"/>
-          </a:xfrm>
-          <a:prstGeom prst="rightArrow">
-            <a:avLst/>
-          </a:prstGeom>
-        </p:spPr>
-        <p:style>
-          <a:lnRef idx="2">
-            <a:schemeClr val="accent1">
-              <a:shade val="50000"/>
-            </a:schemeClr>
-          </a:lnRef>
-          <a:fillRef idx="1">
-            <a:schemeClr val="accent1"/>
-          </a:fillRef>
-          <a:effectRef idx="0">
-            <a:schemeClr val="accent1"/>
-          </a:effectRef>
-          <a:fontRef idx="minor">
-            <a:schemeClr val="lt1"/>
-          </a:fontRef>
-        </p:style>
-        <p:txBody>
-          <a:bodyPr rtlCol="0" anchor="ctr"/>
-          <a:lstStyle/>
-          <a:p>
-            <a:pPr algn="ctr"/>
-            <a:endParaRPr lang="en-US"/>
-          </a:p>
-        </p:txBody>
-      </p:sp>
     </p:spTree>
     <p:extLst>
       <p:ext uri="{BB962C8B-B14F-4D97-AF65-F5344CB8AC3E}">
-        <p14:creationId xmlns:p14="http://schemas.microsoft.com/office/powerpoint/2010/main" val="202993714"/>
+        <p14:creationId xmlns:p14="http://schemas.microsoft.com/office/powerpoint/2010/main" val="1300930618"/>
       </p:ext>
     </p:extLst>
   </p:cSld>
@@ -10782,7 +10848,7 @@
         </p:blipFill>
         <p:spPr>
           <a:xfrm>
-            <a:off x="440031" y="1380442"/>
+            <a:off x="457200" y="1676400"/>
             <a:ext cx="8263939" cy="3343958"/>
           </a:xfrm>
           <a:prstGeom prst="rect">
@@ -12406,7 +12472,7 @@
         <p:spPr>
           <a:xfrm>
             <a:off x="304800" y="152400"/>
-            <a:ext cx="8613648" cy="1219200"/>
+            <a:ext cx="8613648" cy="914400"/>
           </a:xfrm>
         </p:spPr>
         <p:txBody>
@@ -12418,7 +12484,7 @@
             <a:pPr algn="ctr"/>
             <a:r>
               <a:rPr lang="en-US" sz="3200" dirty="0"/>
-              <a:t>Or Else!</a:t>
+              <a:t>Comparison Operators</a:t>
             </a:r>
           </a:p>
         </p:txBody>
@@ -12447,8 +12513,8 @@
         </p:blipFill>
         <p:spPr>
           <a:xfrm>
-            <a:off x="146103" y="1600200"/>
-            <a:ext cx="8851794" cy="3048000"/>
+            <a:off x="1638801" y="1066800"/>
+            <a:ext cx="5866398" cy="2148081"/>
           </a:xfrm>
           <a:prstGeom prst="rect">
             <a:avLst/>
@@ -12473,8 +12539,8 @@
         </p:nvSpPr>
         <p:spPr>
           <a:xfrm>
-            <a:off x="192659" y="5105400"/>
-            <a:ext cx="8839200" cy="1200329"/>
+            <a:off x="152399" y="5215969"/>
+            <a:ext cx="8839200" cy="1477328"/>
           </a:xfrm>
           <a:prstGeom prst="rect">
             <a:avLst/>
@@ -12493,7 +12559,7 @@
             </a:pPr>
             <a:r>
               <a:rPr lang="en-US" dirty="0" smtClean="0"/>
-              <a:t>To extend the “if” statement to allow for a clause condition, the “else” statement is used.</a:t>
+              <a:t>When comparing two items Comparison Operators are utilized.</a:t>
             </a:r>
           </a:p>
           <a:p>
@@ -12503,15 +12569,72 @@
             </a:pPr>
             <a:r>
               <a:rPr lang="en-US" dirty="0" smtClean="0"/>
-              <a:t>This means that if the “if” condition is met, the “if” code will be executed. If it is not met, the “else” code will be executed.</a:t>
-            </a:r>
-          </a:p>
-        </p:txBody>
-      </p:sp>
+              <a:t>The table above express a direct relation between the two objects being compared.</a:t>
+            </a:r>
+          </a:p>
+          <a:p>
+            <a:pPr marL="285750" indent="-285750">
+              <a:buFont typeface="Arial" pitchFamily="34" charset="0"/>
+              <a:buChar char="•"/>
+            </a:pPr>
+            <a:r>
+              <a:rPr lang="en-US" dirty="0" smtClean="0"/>
+              <a:t>These are NOT limited to just </a:t>
+            </a:r>
+            <a:r>
+              <a:rPr lang="en-US" dirty="0" err="1" smtClean="0">
+                <a:solidFill>
+                  <a:srgbClr val="0070C0"/>
+                </a:solidFill>
+              </a:rPr>
+              <a:t>int</a:t>
+            </a:r>
+            <a:r>
+              <a:rPr lang="en-US" dirty="0" smtClean="0"/>
+              <a:t> but can be used to compare any two objects, even Classes and complex objects.</a:t>
+            </a:r>
+            <a:endParaRPr lang="en-US" dirty="0" smtClean="0">
+              <a:solidFill>
+                <a:srgbClr val="0070C0"/>
+              </a:solidFill>
+            </a:endParaRPr>
+          </a:p>
+        </p:txBody>
+      </p:sp>
+      <p:pic>
+        <p:nvPicPr>
+          <p:cNvPr id="6" name="Picture 5"/>
+          <p:cNvPicPr>
+            <a:picLocks noChangeAspect="1"/>
+          </p:cNvPicPr>
+          <p:nvPr/>
+        </p:nvPicPr>
+        <p:blipFill>
+          <a:blip r:embed="rId3" cstate="print">
+            <a:extLst>
+              <a:ext uri="{28A0092B-C50C-407E-A947-70E740481C1C}">
+                <a14:useLocalDpi xmlns:a14="http://schemas.microsoft.com/office/drawing/2010/main" val="0"/>
+              </a:ext>
+            </a:extLst>
+          </a:blip>
+          <a:stretch>
+            <a:fillRect/>
+          </a:stretch>
+        </p:blipFill>
+        <p:spPr>
+          <a:xfrm>
+            <a:off x="3217426" y="3429000"/>
+            <a:ext cx="2709145" cy="1607959"/>
+          </a:xfrm>
+          <a:prstGeom prst="rect">
+            <a:avLst/>
+          </a:prstGeom>
+        </p:spPr>
+      </p:pic>
     </p:spTree>
     <p:extLst>
       <p:ext uri="{BB962C8B-B14F-4D97-AF65-F5344CB8AC3E}">
-        <p14:creationId xmlns:p14="http://schemas.microsoft.com/office/powerpoint/2010/main" val="156994852"/>
+        <p14:creationId xmlns:p14="http://schemas.microsoft.com/office/powerpoint/2010/main" val="1719745184"/>
       </p:ext>
     </p:extLst>
   </p:cSld>
@@ -12551,7 +12674,7 @@
         <p:spPr>
           <a:xfrm>
             <a:off x="304800" y="152400"/>
-            <a:ext cx="8613648" cy="914400"/>
+            <a:ext cx="8613648" cy="1219200"/>
           </a:xfrm>
         </p:spPr>
         <p:txBody>
@@ -12563,7 +12686,7 @@
             <a:pPr algn="ctr"/>
             <a:r>
               <a:rPr lang="en-US" sz="3200" dirty="0"/>
-              <a:t>Switch Statements</a:t>
+              <a:t>Or Else!</a:t>
             </a:r>
           </a:p>
         </p:txBody>
@@ -12579,7 +12702,7 @@
           </p:nvPr>
         </p:nvPicPr>
         <p:blipFill>
-          <a:blip r:embed="rId2" cstate="print">
+          <a:blip r:embed="rId2">
             <a:extLst>
               <a:ext uri="{28A0092B-C50C-407E-A947-70E740481C1C}">
                 <a14:useLocalDpi xmlns:a14="http://schemas.microsoft.com/office/drawing/2010/main" val="0"/>
@@ -12592,8 +12715,8 @@
         </p:blipFill>
         <p:spPr>
           <a:xfrm>
-            <a:off x="1638801" y="1219200"/>
-            <a:ext cx="5866398" cy="4038600"/>
+            <a:off x="146103" y="1600200"/>
+            <a:ext cx="8851794" cy="3048000"/>
           </a:xfrm>
           <a:prstGeom prst="rect">
             <a:avLst/>
@@ -12618,8 +12741,8 @@
         </p:nvSpPr>
         <p:spPr>
           <a:xfrm>
-            <a:off x="228600" y="5334000"/>
-            <a:ext cx="8839200" cy="923330"/>
+            <a:off x="192659" y="5105400"/>
+            <a:ext cx="8839200" cy="1200329"/>
           </a:xfrm>
           <a:prstGeom prst="rect">
             <a:avLst/>
@@ -12638,7 +12761,7 @@
             </a:pPr>
             <a:r>
               <a:rPr lang="en-US" dirty="0" smtClean="0"/>
-              <a:t>When there are multiple “states” that need to be checked to determine the final block of code that needs to run, the “switch” statement is used.</a:t>
+              <a:t>To extend the “if” statement to allow for a clause condition, the “else” statement is used.</a:t>
             </a:r>
           </a:p>
           <a:p>
@@ -12648,7 +12771,7 @@
             </a:pPr>
             <a:r>
               <a:rPr lang="en-US" dirty="0" smtClean="0"/>
-              <a:t>This allows for different value conditions for a specific condition.</a:t>
+              <a:t>This means that if the “if” condition is met, the “if” code will be executed. If it is not met, the “else” code will be executed.</a:t>
             </a:r>
           </a:p>
         </p:txBody>
@@ -12656,7 +12779,7 @@
     </p:spTree>
     <p:extLst>
       <p:ext uri="{BB962C8B-B14F-4D97-AF65-F5344CB8AC3E}">
-        <p14:creationId xmlns:p14="http://schemas.microsoft.com/office/powerpoint/2010/main" val="1500715304"/>
+        <p14:creationId xmlns:p14="http://schemas.microsoft.com/office/powerpoint/2010/main" val="156994852"/>
       </p:ext>
     </p:extLst>
   </p:cSld>
@@ -12708,7 +12831,7 @@
             <a:pPr algn="ctr"/>
             <a:r>
               <a:rPr lang="en-US" sz="3200" dirty="0"/>
-              <a:t>Comparison Operators</a:t>
+              <a:t>Switch Statements</a:t>
             </a:r>
           </a:p>
         </p:txBody>
@@ -12724,7 +12847,7 @@
           </p:nvPr>
         </p:nvPicPr>
         <p:blipFill>
-          <a:blip r:embed="rId2">
+          <a:blip r:embed="rId2" cstate="print">
             <a:extLst>
               <a:ext uri="{28A0092B-C50C-407E-A947-70E740481C1C}">
                 <a14:useLocalDpi xmlns:a14="http://schemas.microsoft.com/office/drawing/2010/main" val="0"/>
@@ -12737,8 +12860,8 @@
         </p:blipFill>
         <p:spPr>
           <a:xfrm>
-            <a:off x="1638801" y="1066800"/>
-            <a:ext cx="5866398" cy="2148081"/>
+            <a:off x="1638801" y="1219200"/>
+            <a:ext cx="5866398" cy="4038600"/>
           </a:xfrm>
           <a:prstGeom prst="rect">
             <a:avLst/>
@@ -12763,8 +12886,8 @@
         </p:nvSpPr>
         <p:spPr>
           <a:xfrm>
-            <a:off x="152399" y="5215969"/>
-            <a:ext cx="8839200" cy="1477328"/>
+            <a:off x="228600" y="5334000"/>
+            <a:ext cx="8839200" cy="923330"/>
           </a:xfrm>
           <a:prstGeom prst="rect">
             <a:avLst/>
@@ -12783,7 +12906,7 @@
             </a:pPr>
             <a:r>
               <a:rPr lang="en-US" dirty="0" smtClean="0"/>
-              <a:t>When comparing two items Comparison Operators are utilized.</a:t>
+              <a:t>When there are multiple “states” that need to be checked to determine the final block of code that needs to run, the “switch” statement is used.</a:t>
             </a:r>
           </a:p>
           <a:p>
@@ -12793,72 +12916,15 @@
             </a:pPr>
             <a:r>
               <a:rPr lang="en-US" dirty="0" smtClean="0"/>
-              <a:t>The table above express a direct relation between the two objects being compared.</a:t>
-            </a:r>
-          </a:p>
-          <a:p>
-            <a:pPr marL="285750" indent="-285750">
-              <a:buFont typeface="Arial" pitchFamily="34" charset="0"/>
-              <a:buChar char="•"/>
-            </a:pPr>
-            <a:r>
-              <a:rPr lang="en-US" dirty="0" smtClean="0"/>
-              <a:t>These are NOT limited to just </a:t>
-            </a:r>
-            <a:r>
-              <a:rPr lang="en-US" dirty="0" err="1" smtClean="0">
-                <a:solidFill>
-                  <a:srgbClr val="0070C0"/>
-                </a:solidFill>
-              </a:rPr>
-              <a:t>int</a:t>
-            </a:r>
-            <a:r>
-              <a:rPr lang="en-US" dirty="0" smtClean="0"/>
-              <a:t> but can be used to compare any two objects, even Classes and complex objects.</a:t>
-            </a:r>
-            <a:endParaRPr lang="en-US" dirty="0" smtClean="0">
-              <a:solidFill>
-                <a:srgbClr val="0070C0"/>
-              </a:solidFill>
-            </a:endParaRPr>
-          </a:p>
-        </p:txBody>
-      </p:sp>
-      <p:pic>
-        <p:nvPicPr>
-          <p:cNvPr id="6" name="Picture 5"/>
-          <p:cNvPicPr>
-            <a:picLocks noChangeAspect="1"/>
-          </p:cNvPicPr>
-          <p:nvPr/>
-        </p:nvPicPr>
-        <p:blipFill>
-          <a:blip r:embed="rId3" cstate="print">
-            <a:extLst>
-              <a:ext uri="{28A0092B-C50C-407E-A947-70E740481C1C}">
-                <a14:useLocalDpi xmlns:a14="http://schemas.microsoft.com/office/drawing/2010/main" val="0"/>
-              </a:ext>
-            </a:extLst>
-          </a:blip>
-          <a:stretch>
-            <a:fillRect/>
-          </a:stretch>
-        </p:blipFill>
-        <p:spPr>
-          <a:xfrm>
-            <a:off x="3217426" y="3429000"/>
-            <a:ext cx="2709145" cy="1607959"/>
-          </a:xfrm>
-          <a:prstGeom prst="rect">
-            <a:avLst/>
-          </a:prstGeom>
-        </p:spPr>
-      </p:pic>
+              <a:t>This allows for different value conditions for a specific condition.</a:t>
+            </a:r>
+          </a:p>
+        </p:txBody>
+      </p:sp>
     </p:spTree>
     <p:extLst>
       <p:ext uri="{BB962C8B-B14F-4D97-AF65-F5344CB8AC3E}">
-        <p14:creationId xmlns:p14="http://schemas.microsoft.com/office/powerpoint/2010/main" val="1719745184"/>
+        <p14:creationId xmlns:p14="http://schemas.microsoft.com/office/powerpoint/2010/main" val="1500715304"/>
       </p:ext>
     </p:extLst>
   </p:cSld>
@@ -15281,6 +15347,13 @@
   <p:clrMapOvr>
     <a:masterClrMapping/>
   </p:clrMapOvr>
+  <p:timing>
+    <p:tnLst>
+      <p:par>
+        <p:cTn id="1" dur="indefinite" restart="never" nodeType="tmRoot"/>
+      </p:par>
+    </p:tnLst>
+  </p:timing>
 </p:sld>
 </file>
 
@@ -17244,6 +17317,13 @@
   <p:clrMapOvr>
     <a:masterClrMapping/>
   </p:clrMapOvr>
+  <p:timing>
+    <p:tnLst>
+      <p:par>
+        <p:cTn id="1" dur="indefinite" restart="never" nodeType="tmRoot"/>
+      </p:par>
+    </p:tnLst>
+  </p:timing>
 </p:sld>
 </file>
 
@@ -19246,6 +19326,13 @@
   <p:clrMapOvr>
     <a:masterClrMapping/>
   </p:clrMapOvr>
+  <p:timing>
+    <p:tnLst>
+      <p:par>
+        <p:cTn id="1" dur="indefinite" restart="never" nodeType="tmRoot"/>
+      </p:par>
+    </p:tnLst>
+  </p:timing>
 </p:sld>
 </file>
 

</xml_diff>